<commit_message>
Revising per GVW's updated data.
</commit_message>
<xml_diff>
--- a/press/software-and-data-carpentry-in-8-slides.pptx
+++ b/press/software-and-data-carpentry-in-8-slides.pptx
@@ -295,7 +295,7 @@
           <a:p>
             <a:fld id="{5BEA7A28-DD0E-514B-A6C1-98CAA5211EB4}" type="datetimeFigureOut">
               <a:rPr lang="en-US" smtClean="0"/>
-              <a:t>24-Apr-15</a:t>
+              <a:t>28-Apr-15</a:t>
             </a:fld>
             <a:endParaRPr lang="en-US"/>
           </a:p>
@@ -465,7 +465,7 @@
           <a:p>
             <a:fld id="{5BEA7A28-DD0E-514B-A6C1-98CAA5211EB4}" type="datetimeFigureOut">
               <a:rPr lang="en-US" smtClean="0"/>
-              <a:t>24-Apr-15</a:t>
+              <a:t>28-Apr-15</a:t>
             </a:fld>
             <a:endParaRPr lang="en-US"/>
           </a:p>
@@ -645,7 +645,7 @@
           <a:p>
             <a:fld id="{5BEA7A28-DD0E-514B-A6C1-98CAA5211EB4}" type="datetimeFigureOut">
               <a:rPr lang="en-US" smtClean="0"/>
-              <a:t>24-Apr-15</a:t>
+              <a:t>28-Apr-15</a:t>
             </a:fld>
             <a:endParaRPr lang="en-US"/>
           </a:p>
@@ -815,7 +815,7 @@
           <a:p>
             <a:fld id="{5BEA7A28-DD0E-514B-A6C1-98CAA5211EB4}" type="datetimeFigureOut">
               <a:rPr lang="en-US" smtClean="0"/>
-              <a:t>24-Apr-15</a:t>
+              <a:t>28-Apr-15</a:t>
             </a:fld>
             <a:endParaRPr lang="en-US"/>
           </a:p>
@@ -1061,7 +1061,7 @@
           <a:p>
             <a:fld id="{5BEA7A28-DD0E-514B-A6C1-98CAA5211EB4}" type="datetimeFigureOut">
               <a:rPr lang="en-US" smtClean="0"/>
-              <a:t>24-Apr-15</a:t>
+              <a:t>28-Apr-15</a:t>
             </a:fld>
             <a:endParaRPr lang="en-US"/>
           </a:p>
@@ -1349,7 +1349,7 @@
           <a:p>
             <a:fld id="{5BEA7A28-DD0E-514B-A6C1-98CAA5211EB4}" type="datetimeFigureOut">
               <a:rPr lang="en-US" smtClean="0"/>
-              <a:t>24-Apr-15</a:t>
+              <a:t>28-Apr-15</a:t>
             </a:fld>
             <a:endParaRPr lang="en-US"/>
           </a:p>
@@ -1771,7 +1771,7 @@
           <a:p>
             <a:fld id="{5BEA7A28-DD0E-514B-A6C1-98CAA5211EB4}" type="datetimeFigureOut">
               <a:rPr lang="en-US" smtClean="0"/>
-              <a:t>24-Apr-15</a:t>
+              <a:t>28-Apr-15</a:t>
             </a:fld>
             <a:endParaRPr lang="en-US"/>
           </a:p>
@@ -1889,7 +1889,7 @@
           <a:p>
             <a:fld id="{5BEA7A28-DD0E-514B-A6C1-98CAA5211EB4}" type="datetimeFigureOut">
               <a:rPr lang="en-US" smtClean="0"/>
-              <a:t>24-Apr-15</a:t>
+              <a:t>28-Apr-15</a:t>
             </a:fld>
             <a:endParaRPr lang="en-US"/>
           </a:p>
@@ -1984,7 +1984,7 @@
           <a:p>
             <a:fld id="{5BEA7A28-DD0E-514B-A6C1-98CAA5211EB4}" type="datetimeFigureOut">
               <a:rPr lang="en-US" smtClean="0"/>
-              <a:t>24-Apr-15</a:t>
+              <a:t>28-Apr-15</a:t>
             </a:fld>
             <a:endParaRPr lang="en-US"/>
           </a:p>
@@ -2261,7 +2261,7 @@
           <a:p>
             <a:fld id="{5BEA7A28-DD0E-514B-A6C1-98CAA5211EB4}" type="datetimeFigureOut">
               <a:rPr lang="en-US" smtClean="0"/>
-              <a:t>24-Apr-15</a:t>
+              <a:t>28-Apr-15</a:t>
             </a:fld>
             <a:endParaRPr lang="en-US"/>
           </a:p>
@@ -2514,7 +2514,7 @@
           <a:p>
             <a:fld id="{5BEA7A28-DD0E-514B-A6C1-98CAA5211EB4}" type="datetimeFigureOut">
               <a:rPr lang="en-US" smtClean="0"/>
-              <a:t>24-Apr-15</a:t>
+              <a:t>28-Apr-15</a:t>
             </a:fld>
             <a:endParaRPr lang="en-US"/>
           </a:p>
@@ -2727,7 +2727,7 @@
           <a:p>
             <a:fld id="{5BEA7A28-DD0E-514B-A6C1-98CAA5211EB4}" type="datetimeFigureOut">
               <a:rPr lang="en-US" smtClean="0"/>
-              <a:t>24-Apr-15</a:t>
+              <a:t>28-Apr-15</a:t>
             </a:fld>
             <a:endParaRPr lang="en-US"/>
           </a:p>
@@ -3430,13 +3430,6 @@
               </a:rPr>
               <a:t>the opportunity</a:t>
             </a:r>
-            <a:endParaRPr lang="en-US" sz="3200" b="1" cap="small" dirty="0" smtClean="0">
-              <a:solidFill>
-                <a:srgbClr val="2F37C4"/>
-              </a:solidFill>
-              <a:latin typeface="Linux Biolinum O"/>
-              <a:cs typeface="Linux Biolinum O"/>
-            </a:endParaRPr>
           </a:p>
           <a:p>
             <a:pPr>
@@ -4224,7 +4217,18 @@
                 <a:ea typeface="DejaVu Sans"/>
                 <a:cs typeface="Linux Biolinum O"/>
               </a:rPr>
-              <a:t>270+ </a:t>
+              <a:t>340</a:t>
+            </a:r>
+            <a:r>
+              <a:rPr lang="en-US" sz="3200" strike="noStrike" dirty="0" smtClean="0">
+                <a:solidFill>
+                  <a:srgbClr val="20267D"/>
+                </a:solidFill>
+                <a:latin typeface="Linux Biolinum O"/>
+                <a:ea typeface="DejaVu Sans"/>
+                <a:cs typeface="Linux Biolinum O"/>
+              </a:rPr>
+              <a:t>+ </a:t>
             </a:r>
             <a:r>
               <a:rPr lang="en-US" sz="3200" strike="noStrike" dirty="0">
@@ -4384,7 +4388,7 @@
                 <a:ea typeface="DejaVu Sans"/>
                 <a:cs typeface="Linux Biolinum O"/>
               </a:rPr>
-              <a:t>20+</a:t>
+              <a:t>25+</a:t>
             </a:r>
             <a:r>
               <a:rPr lang="en-US" sz="3200" strike="noStrike" dirty="0" smtClean="0">
@@ -4395,7 +4399,18 @@
                 <a:ea typeface="DejaVu Sans"/>
                 <a:cs typeface="Linux Biolinum O"/>
               </a:rPr>
-              <a:t> countries.</a:t>
+              <a:t> </a:t>
+            </a:r>
+            <a:r>
+              <a:rPr lang="en-US" sz="3200" strike="noStrike" dirty="0" smtClean="0">
+                <a:solidFill>
+                  <a:srgbClr val="000000"/>
+                </a:solidFill>
+                <a:latin typeface="Linux Biolinum O"/>
+                <a:ea typeface="DejaVu Sans"/>
+                <a:cs typeface="Linux Biolinum O"/>
+              </a:rPr>
+              <a:t>countries.</a:t>
             </a:r>
             <a:endParaRPr sz="3200" dirty="0">
               <a:latin typeface="Linux Biolinum O"/>
@@ -4639,17 +4654,8 @@
                 <a:ea typeface="DejaVu Sans"/>
                 <a:cs typeface="Linux Biolinum O"/>
               </a:rPr>
-              <a:t>Modular programming (Python, R, MATLAB; unit testing)</a:t>
-            </a:r>
-          </a:p>
-          <a:p>
-            <a:pPr marL="342900" indent="-342900">
-              <a:lnSpc>
-                <a:spcPct val="100000"/>
-              </a:lnSpc>
-              <a:buFont typeface="Wingdings" charset="2"/>
-              <a:buChar char="§"/>
-            </a:pPr>
+              <a:t>Modular programming (Python, R, </a:t>
+            </a:r>
             <a:r>
               <a:rPr lang="en-US" sz="3200" strike="noStrike" dirty="0" smtClean="0">
                 <a:solidFill>
@@ -4659,51 +4665,7 @@
                 <a:ea typeface="DejaVu Sans"/>
                 <a:cs typeface="Linux Biolinum O"/>
               </a:rPr>
-              <a:t>Reproducibility and collaboration (</a:t>
-            </a:r>
-            <a:r>
-              <a:rPr lang="en-US" sz="3200" strike="noStrike" dirty="0" err="1" smtClean="0">
-                <a:solidFill>
-                  <a:srgbClr val="000000"/>
-                </a:solidFill>
-                <a:latin typeface="Linux Biolinum O"/>
-                <a:ea typeface="DejaVu Sans"/>
-                <a:cs typeface="Linux Biolinum O"/>
-              </a:rPr>
-              <a:t>Git</a:t>
-            </a:r>
-            <a:r>
-              <a:rPr lang="en-US" sz="3200" strike="noStrike" dirty="0" smtClean="0">
-                <a:solidFill>
-                  <a:srgbClr val="000000"/>
-                </a:solidFill>
-                <a:latin typeface="Linux Biolinum O"/>
-                <a:ea typeface="DejaVu Sans"/>
-                <a:cs typeface="Linux Biolinum O"/>
-              </a:rPr>
-              <a:t> and </a:t>
-            </a:r>
-            <a:r>
-              <a:rPr lang="en-US" sz="3200" strike="noStrike" dirty="0" err="1" smtClean="0">
-                <a:solidFill>
-                  <a:srgbClr val="000000"/>
-                </a:solidFill>
-                <a:latin typeface="Linux Biolinum O"/>
-                <a:ea typeface="DejaVu Sans"/>
-                <a:cs typeface="Linux Biolinum O"/>
-              </a:rPr>
-              <a:t>GitHub</a:t>
-            </a:r>
-            <a:r>
-              <a:rPr lang="en-US" sz="3200" dirty="0" smtClean="0">
-                <a:solidFill>
-                  <a:srgbClr val="000000"/>
-                </a:solidFill>
-                <a:latin typeface="Linux Biolinum O"/>
-                <a:ea typeface="DejaVu Sans"/>
-                <a:cs typeface="Linux Biolinum O"/>
-              </a:rPr>
-              <a:t>)</a:t>
+              <a:t>MATLAB)</a:t>
             </a:r>
             <a:endParaRPr lang="en-US" sz="3200" strike="noStrike" dirty="0" smtClean="0">
               <a:solidFill>
@@ -4731,8 +4693,60 @@
                 <a:ea typeface="DejaVu Sans"/>
                 <a:cs typeface="Linux Biolinum O"/>
               </a:rPr>
-              <a:t>Data management (SQL)</a:t>
-            </a:r>
+              <a:t>Reproducibility and collaboration (</a:t>
+            </a:r>
+            <a:r>
+              <a:rPr lang="en-US" sz="3200" strike="noStrike" dirty="0" err="1" smtClean="0">
+                <a:solidFill>
+                  <a:srgbClr val="000000"/>
+                </a:solidFill>
+                <a:latin typeface="Linux Biolinum O"/>
+                <a:ea typeface="DejaVu Sans"/>
+                <a:cs typeface="Linux Biolinum O"/>
+              </a:rPr>
+              <a:t>Git</a:t>
+            </a:r>
+            <a:r>
+              <a:rPr lang="en-US" sz="3200" strike="noStrike" dirty="0" smtClean="0">
+                <a:solidFill>
+                  <a:srgbClr val="000000"/>
+                </a:solidFill>
+                <a:latin typeface="Linux Biolinum O"/>
+                <a:ea typeface="DejaVu Sans"/>
+                <a:cs typeface="Linux Biolinum O"/>
+              </a:rPr>
+              <a:t> and </a:t>
+            </a:r>
+            <a:r>
+              <a:rPr lang="en-US" sz="3200" strike="noStrike" dirty="0" err="1" smtClean="0">
+                <a:solidFill>
+                  <a:srgbClr val="000000"/>
+                </a:solidFill>
+                <a:latin typeface="Linux Biolinum O"/>
+                <a:ea typeface="DejaVu Sans"/>
+                <a:cs typeface="Linux Biolinum O"/>
+              </a:rPr>
+              <a:t>GitHub</a:t>
+            </a:r>
+            <a:r>
+              <a:rPr lang="en-US" sz="3200" dirty="0">
+                <a:solidFill>
+                  <a:srgbClr val="000000"/>
+                </a:solidFill>
+                <a:latin typeface="Linux Biolinum O"/>
+                <a:ea typeface="DejaVu Sans"/>
+                <a:cs typeface="Linux Biolinum O"/>
+              </a:rPr>
+              <a:t>)</a:t>
+            </a:r>
+            <a:endParaRPr lang="en-US" sz="3200" strike="noStrike" dirty="0" smtClean="0">
+              <a:solidFill>
+                <a:srgbClr val="000000"/>
+              </a:solidFill>
+              <a:latin typeface="Linux Biolinum O"/>
+              <a:ea typeface="DejaVu Sans"/>
+              <a:cs typeface="Linux Biolinum O"/>
+            </a:endParaRPr>
           </a:p>
         </p:txBody>
       </p:sp>

</xml_diff>